<commit_message>
Update WDS trainer presentation - Enterprise-class networking in Azure.pptx
Updating date for ppt
</commit_message>
<xml_diff>
--- a/Whiteboard design session/WDS trainer presentation - Enterprise-class networking in Azure.pptx
+++ b/Whiteboard design session/WDS trainer presentation - Enterprise-class networking in Azure.pptx
@@ -255,7 +255,7 @@
           <a:p>
             <a:fld id="{52A13B17-C506-4D51-BB37-16B365906619}" type="datetimeFigureOut">
               <a:rPr lang="en-US" smtClean="0"/>
-              <a:t>12/12/19</a:t>
+              <a:t>3/5/20</a:t>
             </a:fld>
             <a:endParaRPr lang="en-US" dirty="0"/>
           </a:p>
@@ -584,6 +584,18 @@
               <a:defRPr/>
             </a:pPr>
             <a:r>
+              <a:rPr lang="en-US" sz="950" kern="1200">
+                <a:solidFill>
+                  <a:schemeClr val="tx1"/>
+                </a:solidFill>
+                <a:effectLst/>
+                <a:latin typeface="Segoe UI" panose="020B0502040204020203" pitchFamily="34" charset="0"/>
+                <a:ea typeface="+mn-ea"/>
+                <a:cs typeface="Segoe UI" panose="020B0502040204020203" pitchFamily="34" charset="0"/>
+              </a:rPr>
+              <a:t>March 2020 </a:t>
+            </a:r>
+            <a:r>
               <a:rPr lang="en-US" sz="950" kern="1200" dirty="0">
                 <a:solidFill>
                   <a:schemeClr val="tx1"/>
@@ -593,7 +605,7 @@
                 <a:ea typeface="+mn-ea"/>
                 <a:cs typeface="Segoe UI" panose="020B0502040204020203" pitchFamily="34" charset="0"/>
               </a:rPr>
-              <a:t>November 2019 – no changes to pptx at this time</a:t>
+              <a:t>– no changes to pptx at this time</a:t>
             </a:r>
           </a:p>
           <a:p>
@@ -3365,7 +3377,7 @@
                   <a:prstClr val="black"/>
                 </a:solidFill>
               </a:rPr>
-              <a:t>12/12/19 9:15 AM</a:t>
+              <a:t>3/5/20 12:49 PM</a:t>
             </a:fld>
             <a:endParaRPr lang="en-US" dirty="0">
               <a:solidFill>

</xml_diff>

<commit_message>
November 2022 Test Fix
</commit_message>
<xml_diff>
--- a/Whiteboard design session/WDS trainer presentation - Enterprise-class networking in Azure.pptx
+++ b/Whiteboard design session/WDS trainer presentation - Enterprise-class networking in Azure.pptx
@@ -263,7 +263,7 @@
           <a:p>
             <a:fld id="{52A13B17-C506-4D51-BB37-16B365906619}" type="datetimeFigureOut">
               <a:rPr lang="en-US" smtClean="0"/>
-              <a:t>10/29/2021</a:t>
+              <a:t>11/15/2022</a:t>
             </a:fld>
             <a:endParaRPr lang="en-US" dirty="0"/>
           </a:p>
@@ -592,7 +592,7 @@
               <a:defRPr/>
             </a:pPr>
             <a:r>
-              <a:rPr lang="en-US" sz="950" kern="1200" dirty="0">
+              <a:rPr lang="en-US" sz="950" kern="1200">
                 <a:solidFill>
                   <a:schemeClr val="tx1"/>
                 </a:solidFill>
@@ -601,8 +601,17 @@
                 <a:ea typeface="+mn-ea"/>
                 <a:cs typeface="Segoe UI" panose="020B0502040204020203" pitchFamily="34" charset="0"/>
               </a:rPr>
-              <a:t>June 2020 </a:t>
-            </a:r>
+              <a:t>November 2022</a:t>
+            </a:r>
+            <a:endParaRPr lang="en-US" sz="950" kern="1200" dirty="0">
+              <a:solidFill>
+                <a:schemeClr val="tx1"/>
+              </a:solidFill>
+              <a:effectLst/>
+              <a:latin typeface="Segoe UI" panose="020B0502040204020203" pitchFamily="34" charset="0"/>
+              <a:ea typeface="+mn-ea"/>
+              <a:cs typeface="Segoe UI" panose="020B0502040204020203" pitchFamily="34" charset="0"/>
+            </a:endParaRPr>
           </a:p>
           <a:p>
             <a:pPr marL="0" marR="0" lvl="0" indent="0" algn="l" defTabSz="914400" rtl="0" eaLnBrk="1" fontAlgn="auto" latinLnBrk="0" hangingPunct="1">
@@ -2142,7 +2151,7 @@
           <a:p>
             <a:r>
               <a:rPr lang="en-US" dirty="0"/>
-              <a:t>https://docs.microsoft.com/en-us/azure/networking/networking-virtual-datacenter</a:t>
+              <a:t>https://learn.microsoft.com/azure/cloud-adoption-framework/resources/networking-vdc</a:t>
             </a:r>
           </a:p>
         </p:txBody>
@@ -3390,7 +3399,7 @@
                   <a:prstClr val="black"/>
                 </a:solidFill>
               </a:rPr>
-              <a:t>10/29/2021 3:43 PM</a:t>
+              <a:t>11/15/2022 10:49 AM</a:t>
             </a:fld>
             <a:endParaRPr lang="en-US" dirty="0">
               <a:solidFill>

</xml_diff>

<commit_message>
Updating WDS images, copyrights, figure text (#3)
* Updating copyright and font size in trainer pptx

* Fixing typo in trainer guide

* Collapsing image folders in WDS

* Updating WDS images and figure captions
</commit_message>
<xml_diff>
--- a/Whiteboard design session/WDS trainer presentation - Enterprise-class networking in Azure.pptx
+++ b/Whiteboard design session/WDS trainer presentation - Enterprise-class networking in Azure.pptx
@@ -263,7 +263,7 @@
           <a:p>
             <a:fld id="{52A13B17-C506-4D51-BB37-16B365906619}" type="datetimeFigureOut">
               <a:rPr lang="en-US" smtClean="0"/>
-              <a:t>11/15/2022</a:t>
+              <a:t>11/22/2022</a:t>
             </a:fld>
             <a:endParaRPr lang="en-US" dirty="0"/>
           </a:p>
@@ -592,7 +592,7 @@
               <a:defRPr/>
             </a:pPr>
             <a:r>
-              <a:rPr lang="en-US" sz="950" kern="1200">
+              <a:rPr lang="en-US" sz="950" kern="1200" dirty="0">
                 <a:solidFill>
                   <a:schemeClr val="tx1"/>
                 </a:solidFill>
@@ -603,15 +603,6 @@
               </a:rPr>
               <a:t>November 2022</a:t>
             </a:r>
-            <a:endParaRPr lang="en-US" sz="950" kern="1200" dirty="0">
-              <a:solidFill>
-                <a:schemeClr val="tx1"/>
-              </a:solidFill>
-              <a:effectLst/>
-              <a:latin typeface="Segoe UI" panose="020B0502040204020203" pitchFamily="34" charset="0"/>
-              <a:ea typeface="+mn-ea"/>
-              <a:cs typeface="Segoe UI" panose="020B0502040204020203" pitchFamily="34" charset="0"/>
-            </a:endParaRPr>
           </a:p>
           <a:p>
             <a:pPr marL="0" marR="0" lvl="0" indent="0" algn="l" defTabSz="914400" rtl="0" eaLnBrk="1" fontAlgn="auto" latinLnBrk="0" hangingPunct="1">
@@ -705,7 +696,7 @@
                 <a:ea typeface="+mn-ea"/>
                 <a:cs typeface="Segoe UI" panose="020B0502040204020203" pitchFamily="34" charset="0"/>
               </a:rPr>
-              <a:t>© 2019 Microsoft Corporation. All rights reserved.</a:t>
+              <a:t>© 2022 Microsoft Corporation. All rights reserved.</a:t>
             </a:r>
           </a:p>
           <a:p>
@@ -3399,7 +3390,7 @@
                   <a:prstClr val="black"/>
                 </a:solidFill>
               </a:rPr>
-              <a:t>11/15/2022 10:49 AM</a:t>
+              <a:t>11/22/2022 10:48 AM</a:t>
             </a:fld>
             <a:endParaRPr lang="en-US" dirty="0">
               <a:solidFill>
@@ -18116,7 +18107,7 @@
         </p:nvSpPr>
         <p:spPr>
           <a:xfrm>
-            <a:off x="362057" y="1741246"/>
+            <a:off x="483013" y="1025532"/>
             <a:ext cx="10652686" cy="2930033"/>
           </a:xfrm>
           <a:prstGeom prst="rect">
@@ -18223,14 +18214,14 @@
           <p:nvPr>
             <p:extLst>
               <p:ext uri="{D42A27DB-BD31-4B8C-83A1-F6EECF244321}">
-                <p14:modId xmlns:p14="http://schemas.microsoft.com/office/powerpoint/2010/main" val="454862729"/>
+                <p14:modId xmlns:p14="http://schemas.microsoft.com/office/powerpoint/2010/main" val="2639135067"/>
               </p:ext>
             </p:extLst>
           </p:nvPr>
         </p:nvGraphicFramePr>
         <p:xfrm>
-          <a:off x="3095545" y="3791921"/>
-          <a:ext cx="8040154" cy="2420452"/>
+          <a:off x="3384912" y="2646027"/>
+          <a:ext cx="8040154" cy="3767862"/>
         </p:xfrm>
         <a:graphic>
           <a:graphicData uri="http://schemas.openxmlformats.org/drawingml/2006/table">
@@ -18261,14 +18252,14 @@
                     <a:lstStyle/>
                     <a:p>
                       <a:r>
-                        <a:rPr lang="en-US" sz="1300" b="1" i="1" dirty="0">
+                        <a:rPr lang="en-US" sz="1800" b="1" i="1" dirty="0">
                           <a:latin typeface="Segoe UI" panose="020B0502040204020203" pitchFamily="34" charset="0"/>
                           <a:cs typeface="Segoe UI" panose="020B0502040204020203" pitchFamily="34" charset="0"/>
                         </a:rPr>
                         <a:t>Business</a:t>
                       </a:r>
                       <a:r>
-                        <a:rPr lang="en-US" sz="1300" b="1" i="1" kern="1200" dirty="0">
+                        <a:rPr lang="en-US" sz="1800" b="1" i="1" kern="1200" dirty="0">
                           <a:solidFill>
                             <a:schemeClr val="dk1"/>
                           </a:solidFill>
@@ -18281,19 +18272,19 @@
                     </a:p>
                     <a:p>
                       <a:r>
-                        <a:rPr lang="en-US" sz="1300" b="0" i="0" dirty="0">
+                        <a:rPr lang="en-US" sz="1800" b="0" i="0" dirty="0">
                           <a:latin typeface="Segoe UI" panose="020B0502040204020203" pitchFamily="34" charset="0"/>
                           <a:cs typeface="Segoe UI" panose="020B0502040204020203" pitchFamily="34" charset="0"/>
                         </a:rPr>
                         <a:t>(15 minutes)</a:t>
                       </a:r>
                       <a:br>
-                        <a:rPr lang="en-US" sz="1300" b="0" i="0" dirty="0">
+                        <a:rPr lang="en-US" sz="1800" b="0" i="0" dirty="0">
                           <a:latin typeface="Segoe UI" panose="020B0502040204020203" pitchFamily="34" charset="0"/>
                           <a:cs typeface="Segoe UI" panose="020B0502040204020203" pitchFamily="34" charset="0"/>
                         </a:rPr>
                       </a:br>
-                      <a:endParaRPr lang="en-US" sz="1300" b="0" i="0" dirty="0">
+                      <a:endParaRPr lang="en-US" sz="1800" b="0" i="0" dirty="0">
                         <a:latin typeface="Segoe UI" panose="020B0502040204020203" pitchFamily="34" charset="0"/>
                         <a:cs typeface="Segoe UI" panose="020B0502040204020203" pitchFamily="34" charset="0"/>
                       </a:endParaRPr>
@@ -18324,7 +18315,7 @@
                         <a:defRPr/>
                       </a:pPr>
                       <a:r>
-                        <a:rPr lang="en-US" sz="1300" b="0" dirty="0">
+                        <a:rPr lang="en-US" sz="1800" b="0" dirty="0">
                           <a:solidFill>
                             <a:schemeClr val="bg1"/>
                           </a:solidFill>
@@ -18350,7 +18341,7 @@
                     <a:lstStyle/>
                     <a:p>
                       <a:r>
-                        <a:rPr lang="en-US" sz="1300" b="1" i="1" dirty="0">
+                        <a:rPr lang="en-US" sz="1800" b="1" i="1" dirty="0">
                           <a:latin typeface="Segoe UI" panose="020B0502040204020203" pitchFamily="34" charset="0"/>
                           <a:cs typeface="Segoe UI" panose="020B0502040204020203" pitchFamily="34" charset="0"/>
                         </a:rPr>
@@ -18360,7 +18351,7 @@
                     <a:p>
                       <a:pPr marL="0" algn="l" defTabSz="932742" rtl="0" eaLnBrk="1" latinLnBrk="0" hangingPunct="1"/>
                       <a:r>
-                        <a:rPr lang="en-US" sz="1300" b="0" i="0" kern="1200" dirty="0">
+                        <a:rPr lang="en-US" sz="1800" b="0" i="0" kern="1200" dirty="0">
                           <a:solidFill>
                             <a:schemeClr val="dk1"/>
                           </a:solidFill>
@@ -18371,7 +18362,7 @@
                         <a:t>(35 minutes)</a:t>
                       </a:r>
                       <a:br>
-                        <a:rPr lang="en-US" sz="1300" b="0" i="0" kern="1200" dirty="0">
+                        <a:rPr lang="en-US" sz="1800" b="0" i="0" kern="1200" dirty="0">
                           <a:solidFill>
                             <a:schemeClr val="dk1"/>
                           </a:solidFill>
@@ -18380,7 +18371,7 @@
                           <a:cs typeface="Segoe UI" panose="020B0502040204020203" pitchFamily="34" charset="0"/>
                         </a:rPr>
                       </a:br>
-                      <a:endParaRPr lang="en-US" sz="1300" b="0" i="0" kern="1200" dirty="0">
+                      <a:endParaRPr lang="en-US" sz="1800" b="0" i="0" kern="1200" dirty="0">
                         <a:solidFill>
                           <a:schemeClr val="dk1"/>
                         </a:solidFill>
@@ -18415,7 +18406,7 @@
                         <a:defRPr/>
                       </a:pPr>
                       <a:r>
-                        <a:rPr lang="en-US" sz="1300" kern="1200" baseline="0" dirty="0">
+                        <a:rPr lang="en-US" sz="1800" kern="1200" baseline="0" dirty="0">
                           <a:solidFill>
                             <a:schemeClr val="bg1"/>
                           </a:solidFill>
@@ -18442,7 +18433,7 @@
                     <a:lstStyle/>
                     <a:p>
                       <a:r>
-                        <a:rPr lang="en-US" sz="1300" b="1" i="1" dirty="0">
+                        <a:rPr lang="en-US" sz="1800" b="1" i="1" dirty="0">
                           <a:latin typeface="Segoe UI" panose="020B0502040204020203" pitchFamily="34" charset="0"/>
                           <a:cs typeface="Segoe UI" panose="020B0502040204020203" pitchFamily="34" charset="0"/>
                         </a:rPr>
@@ -18468,7 +18459,7 @@
                         <a:defRPr/>
                       </a:pPr>
                       <a:r>
-                        <a:rPr lang="en-US" sz="1300" b="0" i="0" kern="1200" dirty="0">
+                        <a:rPr lang="en-US" sz="1800" b="0" i="0" kern="1200" dirty="0">
                           <a:solidFill>
                             <a:schemeClr val="dk1"/>
                           </a:solidFill>
@@ -18480,7 +18471,7 @@
                       </a:r>
                     </a:p>
                     <a:p>
-                      <a:endParaRPr lang="en-US" sz="1300" b="1" i="1" dirty="0">
+                      <a:endParaRPr lang="en-US" sz="1800" b="1" i="1" dirty="0">
                         <a:latin typeface="Segoe UI" panose="020B0502040204020203" pitchFamily="34" charset="0"/>
                         <a:cs typeface="Segoe UI" panose="020B0502040204020203" pitchFamily="34" charset="0"/>
                       </a:endParaRPr>
@@ -18498,7 +18489,7 @@
                         <a:buChar char="•"/>
                       </a:pPr>
                       <a:r>
-                        <a:rPr lang="en-US" sz="1300" dirty="0">
+                        <a:rPr lang="en-US" sz="1800" dirty="0">
                           <a:latin typeface="Segoe UI" panose="020B0502040204020203" pitchFamily="34" charset="0"/>
                           <a:cs typeface="Segoe UI" panose="020B0502040204020203" pitchFamily="34" charset="0"/>
                         </a:rPr>
@@ -18511,7 +18502,7 @@
                         <a:buChar char="•"/>
                       </a:pPr>
                       <a:r>
-                        <a:rPr lang="en-US" sz="1300" dirty="0">
+                        <a:rPr lang="en-US" sz="1800" dirty="0">
                           <a:latin typeface="Segoe UI" panose="020B0502040204020203" pitchFamily="34" charset="0"/>
                           <a:cs typeface="Segoe UI" panose="020B0502040204020203" pitchFamily="34" charset="0"/>
                         </a:rPr>
@@ -18524,7 +18515,7 @@
                         <a:buChar char="•"/>
                       </a:pPr>
                       <a:r>
-                        <a:rPr lang="en-US" sz="1300" dirty="0">
+                        <a:rPr lang="en-US" sz="1800" dirty="0">
                           <a:latin typeface="Segoe UI" panose="020B0502040204020203" pitchFamily="34" charset="0"/>
                           <a:cs typeface="Segoe UI" panose="020B0502040204020203" pitchFamily="34" charset="0"/>
                         </a:rPr>
@@ -18537,19 +18528,19 @@
                         <a:buChar char="•"/>
                       </a:pPr>
                       <a:r>
-                        <a:rPr lang="en-US" sz="1300" dirty="0">
+                        <a:rPr lang="en-US" sz="1800" dirty="0">
                           <a:latin typeface="Segoe UI" panose="020B0502040204020203" pitchFamily="34" charset="0"/>
                           <a:cs typeface="Segoe UI" panose="020B0502040204020203" pitchFamily="34" charset="0"/>
                         </a:rPr>
                         <a:t>Prepare for a 15-minute presentation to the customer.</a:t>
                       </a:r>
                       <a:br>
-                        <a:rPr lang="en-US" sz="1300" dirty="0">
+                        <a:rPr lang="en-US" sz="1800" dirty="0">
                           <a:latin typeface="Segoe UI" panose="020B0502040204020203" pitchFamily="34" charset="0"/>
                           <a:cs typeface="Segoe UI" panose="020B0502040204020203" pitchFamily="34" charset="0"/>
                         </a:rPr>
                       </a:br>
-                      <a:endParaRPr lang="en-US" sz="1300" dirty="0">
+                      <a:endParaRPr lang="en-US" sz="1800" dirty="0">
                         <a:latin typeface="Segoe UI" panose="020B0502040204020203" pitchFamily="34" charset="0"/>
                         <a:cs typeface="Segoe UI" panose="020B0502040204020203" pitchFamily="34" charset="0"/>
                       </a:endParaRPr>

</xml_diff>